<commit_message>
ajustes gerais na documentação
</commit_message>
<xml_diff>
--- a/docs/Diagramas/Diagramas de Arquitetura.pptx
+++ b/docs/Diagramas/Diagramas de Arquitetura.pptx
@@ -260,7 +260,7 @@
           <a:p>
             <a:fld id="{E79AB282-DA06-4F6B-B5A0-2CC006DE651C}" type="datetimeFigureOut">
               <a:rPr lang="pt-BR" smtClean="0"/>
-              <a:t>24/05/2020</a:t>
+              <a:t>15/11/2020</a:t>
             </a:fld>
             <a:endParaRPr lang="pt-BR"/>
           </a:p>
@@ -458,7 +458,7 @@
           <a:p>
             <a:fld id="{E79AB282-DA06-4F6B-B5A0-2CC006DE651C}" type="datetimeFigureOut">
               <a:rPr lang="pt-BR" smtClean="0"/>
-              <a:t>24/05/2020</a:t>
+              <a:t>15/11/2020</a:t>
             </a:fld>
             <a:endParaRPr lang="pt-BR"/>
           </a:p>
@@ -666,7 +666,7 @@
           <a:p>
             <a:fld id="{E79AB282-DA06-4F6B-B5A0-2CC006DE651C}" type="datetimeFigureOut">
               <a:rPr lang="pt-BR" smtClean="0"/>
-              <a:t>24/05/2020</a:t>
+              <a:t>15/11/2020</a:t>
             </a:fld>
             <a:endParaRPr lang="pt-BR"/>
           </a:p>
@@ -864,7 +864,7 @@
           <a:p>
             <a:fld id="{E79AB282-DA06-4F6B-B5A0-2CC006DE651C}" type="datetimeFigureOut">
               <a:rPr lang="pt-BR" smtClean="0"/>
-              <a:t>24/05/2020</a:t>
+              <a:t>15/11/2020</a:t>
             </a:fld>
             <a:endParaRPr lang="pt-BR"/>
           </a:p>
@@ -1139,7 +1139,7 @@
           <a:p>
             <a:fld id="{E79AB282-DA06-4F6B-B5A0-2CC006DE651C}" type="datetimeFigureOut">
               <a:rPr lang="pt-BR" smtClean="0"/>
-              <a:t>24/05/2020</a:t>
+              <a:t>15/11/2020</a:t>
             </a:fld>
             <a:endParaRPr lang="pt-BR"/>
           </a:p>
@@ -1404,7 +1404,7 @@
           <a:p>
             <a:fld id="{E79AB282-DA06-4F6B-B5A0-2CC006DE651C}" type="datetimeFigureOut">
               <a:rPr lang="pt-BR" smtClean="0"/>
-              <a:t>24/05/2020</a:t>
+              <a:t>15/11/2020</a:t>
             </a:fld>
             <a:endParaRPr lang="pt-BR"/>
           </a:p>
@@ -1816,7 +1816,7 @@
           <a:p>
             <a:fld id="{E79AB282-DA06-4F6B-B5A0-2CC006DE651C}" type="datetimeFigureOut">
               <a:rPr lang="pt-BR" smtClean="0"/>
-              <a:t>24/05/2020</a:t>
+              <a:t>15/11/2020</a:t>
             </a:fld>
             <a:endParaRPr lang="pt-BR"/>
           </a:p>
@@ -1957,7 +1957,7 @@
           <a:p>
             <a:fld id="{E79AB282-DA06-4F6B-B5A0-2CC006DE651C}" type="datetimeFigureOut">
               <a:rPr lang="pt-BR" smtClean="0"/>
-              <a:t>24/05/2020</a:t>
+              <a:t>15/11/2020</a:t>
             </a:fld>
             <a:endParaRPr lang="pt-BR"/>
           </a:p>
@@ -2070,7 +2070,7 @@
           <a:p>
             <a:fld id="{E79AB282-DA06-4F6B-B5A0-2CC006DE651C}" type="datetimeFigureOut">
               <a:rPr lang="pt-BR" smtClean="0"/>
-              <a:t>24/05/2020</a:t>
+              <a:t>15/11/2020</a:t>
             </a:fld>
             <a:endParaRPr lang="pt-BR"/>
           </a:p>
@@ -2381,7 +2381,7 @@
           <a:p>
             <a:fld id="{E79AB282-DA06-4F6B-B5A0-2CC006DE651C}" type="datetimeFigureOut">
               <a:rPr lang="pt-BR" smtClean="0"/>
-              <a:t>24/05/2020</a:t>
+              <a:t>15/11/2020</a:t>
             </a:fld>
             <a:endParaRPr lang="pt-BR"/>
           </a:p>
@@ -2669,7 +2669,7 @@
           <a:p>
             <a:fld id="{E79AB282-DA06-4F6B-B5A0-2CC006DE651C}" type="datetimeFigureOut">
               <a:rPr lang="pt-BR" smtClean="0"/>
-              <a:t>24/05/2020</a:t>
+              <a:t>15/11/2020</a:t>
             </a:fld>
             <a:endParaRPr lang="pt-BR"/>
           </a:p>
@@ -2910,7 +2910,7 @@
           <a:p>
             <a:fld id="{E79AB282-DA06-4F6B-B5A0-2CC006DE651C}" type="datetimeFigureOut">
               <a:rPr lang="pt-BR" smtClean="0"/>
-              <a:t>24/05/2020</a:t>
+              <a:t>15/11/2020</a:t>
             </a:fld>
             <a:endParaRPr lang="pt-BR"/>
           </a:p>
@@ -4406,224 +4406,6 @@
           </a:fontRef>
         </p:style>
       </p:cxnSp>
-      <p:sp>
-        <p:nvSpPr>
-          <p:cNvPr id="43" name="CaixaDeTexto 42">
-            <a:extLst>
-              <a:ext uri="{FF2B5EF4-FFF2-40B4-BE49-F238E27FC236}">
-                <a16:creationId xmlns:a16="http://schemas.microsoft.com/office/drawing/2014/main" id="{F8EDC253-2909-41CC-ADF0-1995B0087661}"/>
-              </a:ext>
-            </a:extLst>
-          </p:cNvPr>
-          <p:cNvSpPr txBox="1"/>
-          <p:nvPr/>
-        </p:nvSpPr>
-        <p:spPr>
-          <a:xfrm>
-            <a:off x="1371266" y="6324795"/>
-            <a:ext cx="2831481" cy="369332"/>
-          </a:xfrm>
-          <a:prstGeom prst="rect">
-            <a:avLst/>
-          </a:prstGeom>
-          <a:noFill/>
-        </p:spPr>
-        <p:txBody>
-          <a:bodyPr wrap="none" rtlCol="0">
-            <a:spAutoFit/>
-          </a:bodyPr>
-          <a:lstStyle/>
-          <a:p>
-            <a:r>
-              <a:rPr lang="pt-BR" b="1" dirty="0"/>
-              <a:t>Diagrama de Arquitetura v2</a:t>
-            </a:r>
-          </a:p>
-        </p:txBody>
-      </p:sp>
-      <p:sp>
-        <p:nvSpPr>
-          <p:cNvPr id="27" name="Fluxograma: Disco Magnético 26">
-            <a:extLst>
-              <a:ext uri="{FF2B5EF4-FFF2-40B4-BE49-F238E27FC236}">
-                <a16:creationId xmlns:a16="http://schemas.microsoft.com/office/drawing/2014/main" id="{0D0E3ECE-1F5E-4EE5-8CBD-D603A39B67A1}"/>
-              </a:ext>
-            </a:extLst>
-          </p:cNvPr>
-          <p:cNvSpPr/>
-          <p:nvPr/>
-        </p:nvSpPr>
-        <p:spPr>
-          <a:xfrm>
-            <a:off x="1930123" y="5553681"/>
-            <a:ext cx="1713769" cy="656822"/>
-          </a:xfrm>
-          <a:prstGeom prst="flowChartMagneticDisk">
-            <a:avLst/>
-          </a:prstGeom>
-          <a:solidFill>
-            <a:schemeClr val="bg2">
-              <a:lumMod val="75000"/>
-            </a:schemeClr>
-          </a:solidFill>
-          <a:ln>
-            <a:solidFill>
-              <a:schemeClr val="tx1"/>
-            </a:solidFill>
-          </a:ln>
-        </p:spPr>
-        <p:style>
-          <a:lnRef idx="2">
-            <a:schemeClr val="accent1">
-              <a:shade val="50000"/>
-            </a:schemeClr>
-          </a:lnRef>
-          <a:fillRef idx="1">
-            <a:schemeClr val="accent1"/>
-          </a:fillRef>
-          <a:effectRef idx="0">
-            <a:schemeClr val="accent1"/>
-          </a:effectRef>
-          <a:fontRef idx="minor">
-            <a:schemeClr val="lt1"/>
-          </a:fontRef>
-        </p:style>
-        <p:txBody>
-          <a:bodyPr rtlCol="0" anchor="ctr"/>
-          <a:lstStyle/>
-          <a:p>
-            <a:pPr algn="ctr"/>
-            <a:endParaRPr lang="pt-BR"/>
-          </a:p>
-        </p:txBody>
-      </p:sp>
-      <p:sp>
-        <p:nvSpPr>
-          <p:cNvPr id="30" name="CaixaDeTexto 29">
-            <a:extLst>
-              <a:ext uri="{FF2B5EF4-FFF2-40B4-BE49-F238E27FC236}">
-                <a16:creationId xmlns:a16="http://schemas.microsoft.com/office/drawing/2014/main" id="{AFFBB04B-CC58-4368-AD7C-F1260086AAD0}"/>
-              </a:ext>
-            </a:extLst>
-          </p:cNvPr>
-          <p:cNvSpPr txBox="1"/>
-          <p:nvPr/>
-        </p:nvSpPr>
-        <p:spPr>
-          <a:xfrm>
-            <a:off x="2224882" y="5754572"/>
-            <a:ext cx="1245277" cy="369332"/>
-          </a:xfrm>
-          <a:prstGeom prst="rect">
-            <a:avLst/>
-          </a:prstGeom>
-          <a:noFill/>
-        </p:spPr>
-        <p:txBody>
-          <a:bodyPr wrap="none" rtlCol="0">
-            <a:spAutoFit/>
-          </a:bodyPr>
-          <a:lstStyle/>
-          <a:p>
-            <a:r>
-              <a:rPr lang="pt-BR" dirty="0"/>
-              <a:t>PostgreSQL</a:t>
-            </a:r>
-          </a:p>
-        </p:txBody>
-      </p:sp>
-      <p:cxnSp>
-        <p:nvCxnSpPr>
-          <p:cNvPr id="31" name="Conector de Seta Reta 30">
-            <a:extLst>
-              <a:ext uri="{FF2B5EF4-FFF2-40B4-BE49-F238E27FC236}">
-                <a16:creationId xmlns:a16="http://schemas.microsoft.com/office/drawing/2014/main" id="{B89AA8F4-77A4-4AE3-BE65-670D52E38412}"/>
-              </a:ext>
-            </a:extLst>
-          </p:cNvPr>
-          <p:cNvCxnSpPr>
-            <a:cxnSpLocks/>
-            <a:stCxn id="27" idx="4"/>
-          </p:cNvCxnSpPr>
-          <p:nvPr/>
-        </p:nvCxnSpPr>
-        <p:spPr>
-          <a:xfrm>
-            <a:off x="3643892" y="5882092"/>
-            <a:ext cx="3499589" cy="16710"/>
-          </a:xfrm>
-          <a:prstGeom prst="straightConnector1">
-            <a:avLst/>
-          </a:prstGeom>
-          <a:ln w="38100">
-            <a:solidFill>
-              <a:schemeClr val="tx1"/>
-            </a:solidFill>
-            <a:headEnd type="triangle"/>
-            <a:tailEnd type="triangle"/>
-          </a:ln>
-        </p:spPr>
-        <p:style>
-          <a:lnRef idx="1">
-            <a:schemeClr val="accent1"/>
-          </a:lnRef>
-          <a:fillRef idx="0">
-            <a:schemeClr val="accent1"/>
-          </a:fillRef>
-          <a:effectRef idx="0">
-            <a:schemeClr val="accent1"/>
-          </a:effectRef>
-          <a:fontRef idx="minor">
-            <a:schemeClr val="tx1"/>
-          </a:fontRef>
-        </p:style>
-      </p:cxnSp>
-      <p:cxnSp>
-        <p:nvCxnSpPr>
-          <p:cNvPr id="32" name="Conector de Seta Reta 31">
-            <a:extLst>
-              <a:ext uri="{FF2B5EF4-FFF2-40B4-BE49-F238E27FC236}">
-                <a16:creationId xmlns:a16="http://schemas.microsoft.com/office/drawing/2014/main" id="{2B37F4FD-2EBB-4BCF-A459-578ED236D1D4}"/>
-              </a:ext>
-            </a:extLst>
-          </p:cNvPr>
-          <p:cNvCxnSpPr>
-            <a:cxnSpLocks/>
-            <a:stCxn id="27" idx="1"/>
-            <a:endCxn id="14" idx="2"/>
-          </p:cNvCxnSpPr>
-          <p:nvPr/>
-        </p:nvCxnSpPr>
-        <p:spPr>
-          <a:xfrm flipV="1">
-            <a:off x="2787008" y="4752304"/>
-            <a:ext cx="1268" cy="801377"/>
-          </a:xfrm>
-          <a:prstGeom prst="straightConnector1">
-            <a:avLst/>
-          </a:prstGeom>
-          <a:ln w="38100">
-            <a:solidFill>
-              <a:schemeClr val="tx1"/>
-            </a:solidFill>
-            <a:tailEnd type="triangle"/>
-          </a:ln>
-        </p:spPr>
-        <p:style>
-          <a:lnRef idx="1">
-            <a:schemeClr val="accent1"/>
-          </a:lnRef>
-          <a:fillRef idx="0">
-            <a:schemeClr val="accent1"/>
-          </a:fillRef>
-          <a:effectRef idx="0">
-            <a:schemeClr val="accent1"/>
-          </a:effectRef>
-          <a:fontRef idx="minor">
-            <a:schemeClr val="tx1"/>
-          </a:fontRef>
-        </p:style>
-      </p:cxnSp>
     </p:spTree>
     <p:extLst>
       <p:ext uri="{BB962C8B-B14F-4D97-AF65-F5344CB8AC3E}">
@@ -5688,41 +5470,6 @@
       </p:cxnSp>
       <p:sp>
         <p:nvSpPr>
-          <p:cNvPr id="43" name="CaixaDeTexto 42">
-            <a:extLst>
-              <a:ext uri="{FF2B5EF4-FFF2-40B4-BE49-F238E27FC236}">
-                <a16:creationId xmlns:a16="http://schemas.microsoft.com/office/drawing/2014/main" id="{F8EDC253-2909-41CC-ADF0-1995B0087661}"/>
-              </a:ext>
-            </a:extLst>
-          </p:cNvPr>
-          <p:cNvSpPr txBox="1"/>
-          <p:nvPr/>
-        </p:nvSpPr>
-        <p:spPr>
-          <a:xfrm>
-            <a:off x="1418722" y="6282606"/>
-            <a:ext cx="2831481" cy="369332"/>
-          </a:xfrm>
-          <a:prstGeom prst="rect">
-            <a:avLst/>
-          </a:prstGeom>
-          <a:noFill/>
-        </p:spPr>
-        <p:txBody>
-          <a:bodyPr wrap="none" rtlCol="0">
-            <a:spAutoFit/>
-          </a:bodyPr>
-          <a:lstStyle/>
-          <a:p>
-            <a:r>
-              <a:rPr lang="pt-BR" b="1" dirty="0"/>
-              <a:t>Diagrama de Arquitetura v1</a:t>
-            </a:r>
-          </a:p>
-        </p:txBody>
-      </p:sp>
-      <p:sp>
-        <p:nvSpPr>
           <p:cNvPr id="2" name="Retângulo 1">
             <a:extLst>
               <a:ext uri="{FF2B5EF4-FFF2-40B4-BE49-F238E27FC236}">
@@ -6885,213 +6632,6 @@
           </a:p>
         </p:txBody>
       </p:sp>
-      <p:grpSp>
-        <p:nvGrpSpPr>
-          <p:cNvPr id="66" name="Agrupar 65">
-            <a:extLst>
-              <a:ext uri="{FF2B5EF4-FFF2-40B4-BE49-F238E27FC236}">
-                <a16:creationId xmlns:a16="http://schemas.microsoft.com/office/drawing/2014/main" id="{09187517-62D0-4B86-9AFD-E13D7493D746}"/>
-              </a:ext>
-            </a:extLst>
-          </p:cNvPr>
-          <p:cNvGrpSpPr/>
-          <p:nvPr/>
-        </p:nvGrpSpPr>
-        <p:grpSpPr>
-          <a:xfrm>
-            <a:off x="1977577" y="5460643"/>
-            <a:ext cx="1713769" cy="656822"/>
-            <a:chOff x="1980781" y="5342064"/>
-            <a:chExt cx="1713769" cy="656822"/>
-          </a:xfrm>
-        </p:grpSpPr>
-        <p:sp>
-          <p:nvSpPr>
-            <p:cNvPr id="59" name="Fluxograma: Disco Magnético 58">
-              <a:extLst>
-                <a:ext uri="{FF2B5EF4-FFF2-40B4-BE49-F238E27FC236}">
-                  <a16:creationId xmlns:a16="http://schemas.microsoft.com/office/drawing/2014/main" id="{C6965C15-2E54-459E-BC5A-637F90B8839D}"/>
-                </a:ext>
-              </a:extLst>
-            </p:cNvPr>
-            <p:cNvSpPr/>
-            <p:nvPr/>
-          </p:nvSpPr>
-          <p:spPr>
-            <a:xfrm>
-              <a:off x="1980781" y="5342064"/>
-              <a:ext cx="1713769" cy="656822"/>
-            </a:xfrm>
-            <a:prstGeom prst="flowChartMagneticDisk">
-              <a:avLst/>
-            </a:prstGeom>
-            <a:solidFill>
-              <a:schemeClr val="bg2">
-                <a:lumMod val="75000"/>
-              </a:schemeClr>
-            </a:solidFill>
-            <a:ln>
-              <a:solidFill>
-                <a:schemeClr val="tx1"/>
-              </a:solidFill>
-            </a:ln>
-          </p:spPr>
-          <p:style>
-            <a:lnRef idx="2">
-              <a:schemeClr val="accent1">
-                <a:shade val="50000"/>
-              </a:schemeClr>
-            </a:lnRef>
-            <a:fillRef idx="1">
-              <a:schemeClr val="accent1"/>
-            </a:fillRef>
-            <a:effectRef idx="0">
-              <a:schemeClr val="accent1"/>
-            </a:effectRef>
-            <a:fontRef idx="minor">
-              <a:schemeClr val="lt1"/>
-            </a:fontRef>
-          </p:style>
-          <p:txBody>
-            <a:bodyPr rtlCol="0" anchor="ctr"/>
-            <a:lstStyle/>
-            <a:p>
-              <a:pPr algn="ctr"/>
-              <a:endParaRPr lang="pt-BR"/>
-            </a:p>
-          </p:txBody>
-        </p:sp>
-        <p:sp>
-          <p:nvSpPr>
-            <p:cNvPr id="60" name="CaixaDeTexto 59">
-              <a:extLst>
-                <a:ext uri="{FF2B5EF4-FFF2-40B4-BE49-F238E27FC236}">
-                  <a16:creationId xmlns:a16="http://schemas.microsoft.com/office/drawing/2014/main" id="{A114BB3F-0D73-4278-AACB-3E5E7120C908}"/>
-                </a:ext>
-              </a:extLst>
-            </p:cNvPr>
-            <p:cNvSpPr txBox="1"/>
-            <p:nvPr/>
-          </p:nvSpPr>
-          <p:spPr>
-            <a:xfrm>
-              <a:off x="2215026" y="5590917"/>
-              <a:ext cx="1245277" cy="369332"/>
-            </a:xfrm>
-            <a:prstGeom prst="rect">
-              <a:avLst/>
-            </a:prstGeom>
-            <a:noFill/>
-          </p:spPr>
-          <p:txBody>
-            <a:bodyPr wrap="none" rtlCol="0">
-              <a:spAutoFit/>
-            </a:bodyPr>
-            <a:lstStyle/>
-            <a:p>
-              <a:r>
-                <a:rPr lang="pt-BR" dirty="0"/>
-                <a:t>PostgreSQL</a:t>
-              </a:r>
-            </a:p>
-          </p:txBody>
-        </p:sp>
-      </p:grpSp>
-      <p:cxnSp>
-        <p:nvCxnSpPr>
-          <p:cNvPr id="61" name="Conector de Seta Reta 60">
-            <a:extLst>
-              <a:ext uri="{FF2B5EF4-FFF2-40B4-BE49-F238E27FC236}">
-                <a16:creationId xmlns:a16="http://schemas.microsoft.com/office/drawing/2014/main" id="{0BAFF56B-F4CE-48F3-8428-F5FFDC8707B9}"/>
-              </a:ext>
-            </a:extLst>
-          </p:cNvPr>
-          <p:cNvCxnSpPr>
-            <a:cxnSpLocks/>
-            <a:stCxn id="59" idx="2"/>
-            <a:endCxn id="31" idx="1"/>
-          </p:cNvCxnSpPr>
-          <p:nvPr/>
-        </p:nvCxnSpPr>
-        <p:spPr>
-          <a:xfrm rot="10800000">
-            <a:off x="708339" y="2335456"/>
-            <a:ext cx="1269238" cy="3453598"/>
-          </a:xfrm>
-          <a:prstGeom prst="bentConnector3">
-            <a:avLst>
-              <a:gd name="adj1" fmla="val 122187"/>
-            </a:avLst>
-          </a:prstGeom>
-          <a:ln w="38100">
-            <a:solidFill>
-              <a:schemeClr val="tx1"/>
-            </a:solidFill>
-            <a:tailEnd type="triangle"/>
-          </a:ln>
-        </p:spPr>
-        <p:style>
-          <a:lnRef idx="1">
-            <a:schemeClr val="accent1"/>
-          </a:lnRef>
-          <a:fillRef idx="0">
-            <a:schemeClr val="accent1"/>
-          </a:fillRef>
-          <a:effectRef idx="0">
-            <a:schemeClr val="accent1"/>
-          </a:effectRef>
-          <a:fontRef idx="minor">
-            <a:schemeClr val="tx1"/>
-          </a:fontRef>
-        </p:style>
-      </p:cxnSp>
-      <p:cxnSp>
-        <p:nvCxnSpPr>
-          <p:cNvPr id="62" name="Conector de Seta Reta 61">
-            <a:extLst>
-              <a:ext uri="{FF2B5EF4-FFF2-40B4-BE49-F238E27FC236}">
-                <a16:creationId xmlns:a16="http://schemas.microsoft.com/office/drawing/2014/main" id="{C2A053E5-95D1-4E2A-98C3-9F8E64536641}"/>
-              </a:ext>
-            </a:extLst>
-          </p:cNvPr>
-          <p:cNvCxnSpPr>
-            <a:cxnSpLocks/>
-            <a:stCxn id="59" idx="4"/>
-            <a:endCxn id="58" idx="1"/>
-          </p:cNvCxnSpPr>
-          <p:nvPr/>
-        </p:nvCxnSpPr>
-        <p:spPr>
-          <a:xfrm flipV="1">
-            <a:off x="3691346" y="5775583"/>
-            <a:ext cx="3643567" cy="13471"/>
-          </a:xfrm>
-          <a:prstGeom prst="straightConnector1">
-            <a:avLst/>
-          </a:prstGeom>
-          <a:ln w="38100">
-            <a:solidFill>
-              <a:schemeClr val="tx1"/>
-            </a:solidFill>
-            <a:headEnd type="triangle"/>
-            <a:tailEnd type="triangle"/>
-          </a:ln>
-        </p:spPr>
-        <p:style>
-          <a:lnRef idx="1">
-            <a:schemeClr val="accent1"/>
-          </a:lnRef>
-          <a:fillRef idx="0">
-            <a:schemeClr val="accent1"/>
-          </a:fillRef>
-          <a:effectRef idx="0">
-            <a:schemeClr val="accent1"/>
-          </a:effectRef>
-          <a:fontRef idx="minor">
-            <a:schemeClr val="tx1"/>
-          </a:fontRef>
-        </p:style>
-      </p:cxnSp>
     </p:spTree>
     <p:extLst>
       <p:ext uri="{BB962C8B-B14F-4D97-AF65-F5344CB8AC3E}">

</xml_diff>